<commit_message>
OWL toegevoegd aan presentatie
</commit_message>
<xml_diff>
--- a/Presentation.pptx
+++ b/Presentation.pptx
@@ -1,6 +1,6 @@
 
 <file path=ppt/presentation.xml><?xml version="1.0" encoding="utf-8"?>
-<p:presentation xmlns:a="http://schemas.openxmlformats.org/drawingml/2006/main" xmlns:r="http://schemas.openxmlformats.org/officeDocument/2006/relationships" xmlns:p="http://schemas.openxmlformats.org/presentationml/2006/main" compatMode="1" strictFirstAndLastChars="0" saveSubsetFonts="1">
+<p:presentation xmlns:a="http://schemas.openxmlformats.org/drawingml/2006/main" xmlns:r="http://schemas.openxmlformats.org/officeDocument/2006/relationships" xmlns:p="http://schemas.openxmlformats.org/presentationml/2006/main" strictFirstAndLastChars="0" saveSubsetFonts="1">
   <p:sldMasterIdLst>
     <p:sldMasterId id="2147483649" r:id="rId1"/>
   </p:sldMasterIdLst>
@@ -4285,6 +4285,13 @@
   <p:clrMapOvr>
     <a:masterClrMapping/>
   </p:clrMapOvr>
+  <p:timing>
+    <p:tnLst>
+      <p:par>
+        <p:cTn xmlns:p14="http://schemas.microsoft.com/office/powerpoint/2010/main" id="1" dur="indefinite" restart="never" nodeType="tmRoot"/>
+      </p:par>
+    </p:tnLst>
+  </p:timing>
 </p:sld>
 </file>
 
@@ -4655,6 +4662,13 @@
   <p:clrMapOvr>
     <a:masterClrMapping/>
   </p:clrMapOvr>
+  <p:timing>
+    <p:tnLst>
+      <p:par>
+        <p:cTn xmlns:p14="http://schemas.microsoft.com/office/powerpoint/2010/main" id="1" dur="indefinite" restart="never" nodeType="tmRoot"/>
+      </p:par>
+    </p:tnLst>
+  </p:timing>
 </p:sld>
 </file>
 
@@ -4708,12 +4722,386 @@
             <p:ph idx="1"/>
           </p:nvPr>
         </p:nvSpPr>
-        <p:spPr/>
+        <p:spPr>
+          <a:xfrm>
+            <a:off x="925513" y="1248427"/>
+            <a:ext cx="7138987" cy="4667535"/>
+          </a:xfrm>
+        </p:spPr>
         <p:txBody>
           <a:bodyPr/>
           <a:lstStyle/>
           <a:p>
-            <a:endParaRPr lang="en-US"/>
+            <a:pPr marL="0" indent="0">
+              <a:buNone/>
+            </a:pPr>
+            <a:r>
+              <a:rPr lang="en-US" sz="1400" dirty="0" smtClean="0"/>
+              <a:t>:</a:t>
+            </a:r>
+            <a:r>
+              <a:rPr lang="en-US" sz="1400" dirty="0" err="1" smtClean="0"/>
+              <a:t>MultiAuthorPaper</a:t>
+            </a:r>
+            <a:endParaRPr lang="en-US" sz="1400" dirty="0" smtClean="0"/>
+          </a:p>
+          <a:p>
+            <a:pPr marL="0" indent="0">
+              <a:buNone/>
+            </a:pPr>
+            <a:r>
+              <a:rPr lang="en-US" sz="1400" dirty="0" smtClean="0"/>
+              <a:t>  a </a:t>
+            </a:r>
+            <a:r>
+              <a:rPr lang="en-US" sz="1400" dirty="0" err="1" smtClean="0"/>
+              <a:t>owl:Class</a:t>
+            </a:r>
+            <a:r>
+              <a:rPr lang="en-US" sz="1400" dirty="0" smtClean="0"/>
+              <a:t> ;</a:t>
+            </a:r>
+          </a:p>
+          <a:p>
+            <a:pPr marL="0" indent="0">
+              <a:buNone/>
+            </a:pPr>
+            <a:r>
+              <a:rPr lang="en-US" sz="1400" dirty="0" smtClean="0"/>
+              <a:t>  </a:t>
+            </a:r>
+            <a:r>
+              <a:rPr lang="en-US" sz="1400" dirty="0" err="1" smtClean="0"/>
+              <a:t>rdfs:subClassOf</a:t>
+            </a:r>
+            <a:r>
+              <a:rPr lang="en-US" sz="1400" dirty="0" smtClean="0"/>
+              <a:t> </a:t>
+            </a:r>
+            <a:r>
+              <a:rPr lang="en-US" sz="1400" dirty="0" err="1" smtClean="0"/>
+              <a:t>swrc:InProceedings</a:t>
+            </a:r>
+            <a:r>
+              <a:rPr lang="en-US" sz="1400" dirty="0" smtClean="0"/>
+              <a:t> ;</a:t>
+            </a:r>
+          </a:p>
+          <a:p>
+            <a:pPr marL="0" indent="0">
+              <a:buNone/>
+            </a:pPr>
+            <a:r>
+              <a:rPr lang="en-US" sz="1400" dirty="0" smtClean="0"/>
+              <a:t>  </a:t>
+            </a:r>
+            <a:r>
+              <a:rPr lang="en-US" sz="1400" dirty="0" err="1" smtClean="0"/>
+              <a:t>rdfs:subClassOf</a:t>
+            </a:r>
+            <a:endParaRPr lang="en-US" sz="1400" dirty="0" smtClean="0"/>
+          </a:p>
+          <a:p>
+            <a:pPr marL="0" indent="0">
+              <a:buNone/>
+            </a:pPr>
+            <a:r>
+              <a:rPr lang="en-US" sz="1400" dirty="0" smtClean="0"/>
+              <a:t>    [ a </a:t>
+            </a:r>
+            <a:r>
+              <a:rPr lang="en-US" sz="1400" dirty="0" err="1" smtClean="0"/>
+              <a:t>owl:Restriction</a:t>
+            </a:r>
+            <a:r>
+              <a:rPr lang="en-US" sz="1400" dirty="0" smtClean="0"/>
+              <a:t> ;</a:t>
+            </a:r>
+          </a:p>
+          <a:p>
+            <a:pPr marL="0" indent="0">
+              <a:buNone/>
+            </a:pPr>
+            <a:r>
+              <a:rPr lang="en-US" sz="1400" dirty="0" smtClean="0"/>
+              <a:t>      </a:t>
+            </a:r>
+            <a:r>
+              <a:rPr lang="en-US" sz="1400" dirty="0" err="1" smtClean="0"/>
+              <a:t>owl:onProperty</a:t>
+            </a:r>
+            <a:r>
+              <a:rPr lang="en-US" sz="1400" dirty="0" smtClean="0"/>
+              <a:t> </a:t>
+            </a:r>
+            <a:r>
+              <a:rPr lang="en-US" sz="1400" dirty="0" err="1" smtClean="0"/>
+              <a:t>dc:author</a:t>
+            </a:r>
+            <a:r>
+              <a:rPr lang="en-US" sz="1400" dirty="0" smtClean="0"/>
+              <a:t> ;</a:t>
+            </a:r>
+          </a:p>
+          <a:p>
+            <a:pPr marL="0" indent="0">
+              <a:buNone/>
+            </a:pPr>
+            <a:r>
+              <a:rPr lang="en-US" sz="1400" dirty="0" smtClean="0"/>
+              <a:t>      </a:t>
+            </a:r>
+            <a:r>
+              <a:rPr lang="en-US" sz="1400" dirty="0" err="1" smtClean="0"/>
+              <a:t>owl:minCardinality</a:t>
+            </a:r>
+            <a:r>
+              <a:rPr lang="en-US" sz="1400" dirty="0" smtClean="0"/>
+              <a:t> "4"^^&lt;http://www.w3.org/2001/</a:t>
+            </a:r>
+            <a:r>
+              <a:rPr lang="en-US" sz="1400" dirty="0" err="1" smtClean="0"/>
+              <a:t>XMLSchema#int</a:t>
+            </a:r>
+            <a:r>
+              <a:rPr lang="en-US" sz="1400" dirty="0" smtClean="0"/>
+              <a:t>&gt;</a:t>
+            </a:r>
+          </a:p>
+          <a:p>
+            <a:pPr marL="0" indent="0">
+              <a:buNone/>
+            </a:pPr>
+            <a:r>
+              <a:rPr lang="en-US" sz="1400" dirty="0" smtClean="0"/>
+              <a:t>    ] .</a:t>
+            </a:r>
+          </a:p>
+        </p:txBody>
+      </p:sp>
+      <p:sp>
+        <p:nvSpPr>
+          <p:cNvPr id="4" name="TextBox 3"/>
+          <p:cNvSpPr txBox="1"/>
+          <p:nvPr/>
+        </p:nvSpPr>
+        <p:spPr>
+          <a:xfrm>
+            <a:off x="3957065" y="2571750"/>
+            <a:ext cx="4474352" cy="2893100"/>
+          </a:xfrm>
+          <a:prstGeom prst="rect">
+            <a:avLst/>
+          </a:prstGeom>
+          <a:solidFill>
+            <a:schemeClr val="accent1"/>
+          </a:solidFill>
+        </p:spPr>
+        <p:txBody>
+          <a:bodyPr wrap="none" rtlCol="0">
+            <a:spAutoFit/>
+          </a:bodyPr>
+          <a:lstStyle/>
+          <a:p>
+            <a:pPr marL="0" indent="0" algn="l">
+              <a:buNone/>
+            </a:pPr>
+            <a:r>
+              <a:rPr lang="en-US" sz="1400" dirty="0" smtClean="0"/>
+              <a:t>:Authors</a:t>
+            </a:r>
+          </a:p>
+          <a:p>
+            <a:pPr marL="0" indent="0" algn="l">
+              <a:buNone/>
+            </a:pPr>
+            <a:r>
+              <a:rPr lang="en-US" sz="1400" dirty="0" smtClean="0"/>
+              <a:t>	a </a:t>
+            </a:r>
+            <a:r>
+              <a:rPr lang="en-US" sz="1400" dirty="0" err="1" smtClean="0"/>
+              <a:t>owl:Class</a:t>
+            </a:r>
+            <a:r>
+              <a:rPr lang="en-US" sz="1400" dirty="0" smtClean="0"/>
+              <a:t> ;</a:t>
+            </a:r>
+          </a:p>
+          <a:p>
+            <a:pPr marL="0" indent="0" algn="l">
+              <a:buNone/>
+            </a:pPr>
+            <a:r>
+              <a:rPr lang="en-US" sz="1400" dirty="0" smtClean="0"/>
+              <a:t>	</a:t>
+            </a:r>
+            <a:r>
+              <a:rPr lang="en-US" sz="1400" dirty="0" err="1" smtClean="0"/>
+              <a:t>rdfs:subClassOf</a:t>
+            </a:r>
+            <a:endParaRPr lang="en-US" sz="1400" dirty="0" smtClean="0"/>
+          </a:p>
+          <a:p>
+            <a:pPr marL="0" indent="0" algn="l">
+              <a:buNone/>
+            </a:pPr>
+            <a:r>
+              <a:rPr lang="en-US" sz="1400" dirty="0" smtClean="0"/>
+              <a:t>	  [ a </a:t>
+            </a:r>
+            <a:r>
+              <a:rPr lang="en-US" sz="1400" dirty="0" err="1" smtClean="0"/>
+              <a:t>owl:Restriction</a:t>
+            </a:r>
+            <a:r>
+              <a:rPr lang="en-US" sz="1400" dirty="0" smtClean="0"/>
+              <a:t> ;</a:t>
+            </a:r>
+          </a:p>
+          <a:p>
+            <a:pPr marL="0" indent="0" algn="l">
+              <a:buNone/>
+            </a:pPr>
+            <a:r>
+              <a:rPr lang="en-US" sz="1400" dirty="0" smtClean="0"/>
+              <a:t>		</a:t>
+            </a:r>
+            <a:r>
+              <a:rPr lang="en-US" sz="1400" dirty="0" err="1" smtClean="0"/>
+              <a:t>owl:onProperty</a:t>
+            </a:r>
+            <a:r>
+              <a:rPr lang="en-US" sz="1400" dirty="0" smtClean="0"/>
+              <a:t> </a:t>
+            </a:r>
+            <a:r>
+              <a:rPr lang="en-US" sz="1400" dirty="0" err="1" smtClean="0"/>
+              <a:t>dc:authorOf</a:t>
+            </a:r>
+            <a:r>
+              <a:rPr lang="en-US" sz="1400" dirty="0" smtClean="0"/>
+              <a:t> ;</a:t>
+            </a:r>
+          </a:p>
+          <a:p>
+            <a:pPr marL="0" indent="0" algn="l">
+              <a:buNone/>
+            </a:pPr>
+            <a:r>
+              <a:rPr lang="en-US" sz="1400" dirty="0" smtClean="0"/>
+              <a:t>		</a:t>
+            </a:r>
+            <a:r>
+              <a:rPr lang="en-US" sz="1400" dirty="0" err="1" smtClean="0"/>
+              <a:t>owl:someValuesFrom</a:t>
+            </a:r>
+            <a:r>
+              <a:rPr lang="en-US" sz="1400" dirty="0" smtClean="0"/>
+              <a:t> :Papers].</a:t>
+            </a:r>
+          </a:p>
+          <a:p>
+            <a:pPr marL="0" indent="0" algn="l">
+              <a:buNone/>
+            </a:pPr>
+            <a:r>
+              <a:rPr lang="en-US" sz="1400" dirty="0" smtClean="0"/>
+              <a:t>		</a:t>
+            </a:r>
+          </a:p>
+          <a:p>
+            <a:pPr marL="0" indent="0" algn="l">
+              <a:buNone/>
+            </a:pPr>
+            <a:r>
+              <a:rPr lang="en-US" sz="1400" dirty="0" err="1" smtClean="0"/>
+              <a:t>dc:author</a:t>
+            </a:r>
+            <a:r>
+              <a:rPr lang="en-US" sz="1400" dirty="0" smtClean="0"/>
+              <a:t> </a:t>
+            </a:r>
+            <a:r>
+              <a:rPr lang="en-US" sz="1400" dirty="0" err="1" smtClean="0"/>
+              <a:t>owl:inverseOf</a:t>
+            </a:r>
+            <a:r>
+              <a:rPr lang="en-US" sz="1400" dirty="0" smtClean="0"/>
+              <a:t> :</a:t>
+            </a:r>
+            <a:r>
+              <a:rPr lang="en-US" sz="1400" dirty="0" err="1" smtClean="0"/>
+              <a:t>authorOf</a:t>
+            </a:r>
+            <a:r>
+              <a:rPr lang="en-US" sz="1400" dirty="0" smtClean="0"/>
+              <a:t> .</a:t>
+            </a:r>
+          </a:p>
+          <a:p>
+            <a:pPr marL="0" indent="0" algn="l">
+              <a:buNone/>
+            </a:pPr>
+            <a:r>
+              <a:rPr lang="en-US" sz="1400" dirty="0" smtClean="0"/>
+              <a:t>	</a:t>
+            </a:r>
+          </a:p>
+          <a:p>
+            <a:pPr marL="0" indent="0" algn="l">
+              <a:buNone/>
+            </a:pPr>
+            <a:r>
+              <a:rPr lang="en-US" sz="1400" dirty="0" smtClean="0"/>
+              <a:t>:Papers</a:t>
+            </a:r>
+          </a:p>
+          <a:p>
+            <a:pPr marL="0" indent="0" algn="l">
+              <a:buNone/>
+            </a:pPr>
+            <a:r>
+              <a:rPr lang="en-US" sz="1400" dirty="0" smtClean="0"/>
+              <a:t>	a </a:t>
+            </a:r>
+            <a:r>
+              <a:rPr lang="en-US" sz="1400" dirty="0" err="1" smtClean="0"/>
+              <a:t>owl:Class</a:t>
+            </a:r>
+            <a:r>
+              <a:rPr lang="en-US" sz="1400" dirty="0" smtClean="0"/>
+              <a:t> ;</a:t>
+            </a:r>
+          </a:p>
+          <a:p>
+            <a:pPr marL="0" indent="0" algn="l">
+              <a:buNone/>
+            </a:pPr>
+            <a:r>
+              <a:rPr lang="en-US" sz="1400" dirty="0" smtClean="0"/>
+              <a:t>	</a:t>
+            </a:r>
+            <a:r>
+              <a:rPr lang="en-US" sz="1400" dirty="0" err="1" smtClean="0"/>
+              <a:t>rdfs:subClassOf</a:t>
+            </a:r>
+            <a:r>
+              <a:rPr lang="en-US" sz="1400" dirty="0" smtClean="0"/>
+              <a:t> </a:t>
+            </a:r>
+            <a:r>
+              <a:rPr lang="en-US" sz="1400" dirty="0" err="1" smtClean="0"/>
+              <a:t>swrc:InProceedings</a:t>
+            </a:r>
+            <a:r>
+              <a:rPr lang="en-US" sz="1400" dirty="0" smtClean="0"/>
+              <a:t> .</a:t>
+            </a:r>
+          </a:p>
+          <a:p>
+            <a:pPr algn="l"/>
+            <a:endParaRPr lang="en-US" sz="1400" dirty="0"/>
           </a:p>
         </p:txBody>
       </p:sp>
@@ -4727,6 +5115,84 @@
   <p:clrMapOvr>
     <a:masterClrMapping/>
   </p:clrMapOvr>
+  <p:timing>
+    <p:tnLst>
+      <p:par>
+        <p:cTn xmlns:p14="http://schemas.microsoft.com/office/powerpoint/2010/main" id="1" dur="indefinite" restart="never" nodeType="tmRoot">
+          <p:childTnLst>
+            <p:seq concurrent="1" nextAc="seek">
+              <p:cTn id="2" dur="indefinite" nodeType="mainSeq">
+                <p:childTnLst>
+                  <p:par>
+                    <p:cTn id="3" fill="hold">
+                      <p:stCondLst>
+                        <p:cond delay="indefinite"/>
+                      </p:stCondLst>
+                      <p:childTnLst>
+                        <p:par>
+                          <p:cTn id="4" fill="hold">
+                            <p:stCondLst>
+                              <p:cond delay="0"/>
+                            </p:stCondLst>
+                            <p:childTnLst>
+                              <p:par>
+                                <p:cTn id="5" presetID="1" presetClass="entr" presetSubtype="0" fill="hold" grpId="0" nodeType="clickEffect">
+                                  <p:stCondLst>
+                                    <p:cond delay="0"/>
+                                  </p:stCondLst>
+                                  <p:childTnLst>
+                                    <p:set>
+                                      <p:cBhvr>
+                                        <p:cTn id="6" dur="1" fill="hold">
+                                          <p:stCondLst>
+                                            <p:cond delay="0"/>
+                                          </p:stCondLst>
+                                        </p:cTn>
+                                        <p:tgtEl>
+                                          <p:spTgt spid="4"/>
+                                        </p:tgtEl>
+                                        <p:attrNameLst>
+                                          <p:attrName>style.visibility</p:attrName>
+                                        </p:attrNameLst>
+                                      </p:cBhvr>
+                                      <p:to>
+                                        <p:strVal val="visible"/>
+                                      </p:to>
+                                    </p:set>
+                                  </p:childTnLst>
+                                </p:cTn>
+                              </p:par>
+                            </p:childTnLst>
+                          </p:cTn>
+                        </p:par>
+                      </p:childTnLst>
+                    </p:cTn>
+                  </p:par>
+                </p:childTnLst>
+              </p:cTn>
+              <p:prevCondLst>
+                <p:cond evt="onPrev" delay="0">
+                  <p:tgtEl>
+                    <p:sldTgt/>
+                  </p:tgtEl>
+                </p:cond>
+              </p:prevCondLst>
+              <p:nextCondLst>
+                <p:cond evt="onNext" delay="0">
+                  <p:tgtEl>
+                    <p:sldTgt/>
+                  </p:tgtEl>
+                </p:cond>
+              </p:nextCondLst>
+            </p:seq>
+          </p:childTnLst>
+        </p:cTn>
+      </p:par>
+    </p:tnLst>
+    <p:bldLst>
+      <p:bldP spid="4" grpId="0" animBg="1"/>
+    </p:bldLst>
+  </p:timing>
 </p:sld>
 </file>
 
@@ -5135,6 +5601,13 @@
   <p:clrMapOvr>
     <a:masterClrMapping/>
   </p:clrMapOvr>
+  <p:timing>
+    <p:tnLst>
+      <p:par>
+        <p:cTn xmlns:p14="http://schemas.microsoft.com/office/powerpoint/2010/main" id="1" dur="indefinite" restart="never" nodeType="tmRoot"/>
+      </p:par>
+    </p:tnLst>
+  </p:timing>
 </p:sld>
 </file>
 

</xml_diff>

<commit_message>
Add support for ASK and (limited) DESCRIBE
</commit_message>
<xml_diff>
--- a/Presentation.pptx
+++ b/Presentation.pptx
@@ -4856,8 +4856,12 @@
               <a:t>owl:minCardinality</a:t>
             </a:r>
             <a:r>
+              <a:rPr lang="en-US" sz="1400" smtClean="0"/>
+              <a:t> “5"</a:t>
+            </a:r>
+            <a:r>
               <a:rPr lang="en-US" sz="1400" dirty="0" smtClean="0"/>
-              <a:t> "4"^^&lt;http://www.w3.org/2001/</a:t>
+              <a:t>^^&lt;http://www.w3.org/2001/</a:t>
             </a:r>
             <a:r>
               <a:rPr lang="en-US" sz="1400" dirty="0" err="1" smtClean="0"/>
@@ -5479,7 +5483,7 @@
               </a:lnSpc>
               <a:buNone/>
             </a:pPr>
-            <a:endParaRPr lang="en-US" sz="1100" smtClean="0"/>
+            <a:endParaRPr lang="en-US" sz="1100" dirty="0" smtClean="0"/>
           </a:p>
           <a:p>
             <a:pPr marL="0" indent="0">

</xml_diff>